<commit_message>
updated deck..added more images
</commit_message>
<xml_diff>
--- a/Capstone Two/reports/Capstone_Presentation.pptx
+++ b/Capstone Two/reports/Capstone_Presentation.pptx
@@ -19695,63 +19695,6 @@
           </a:ln>
         </p:spPr>
       </p:pic>
-      <p:sp>
-        <p:nvSpPr>
-          <p:cNvPr id="7" name="Cloud 6">
-            <a:extLst>
-              <a:ext uri="{FF2B5EF4-FFF2-40B4-BE49-F238E27FC236}">
-                <a16:creationId xmlns:a16="http://schemas.microsoft.com/office/drawing/2014/main" id="{9E137C9A-E087-4B37-A3F0-A0B288707FA2}"/>
-              </a:ext>
-            </a:extLst>
-          </p:cNvPr>
-          <p:cNvSpPr/>
-          <p:nvPr/>
-        </p:nvSpPr>
-        <p:spPr>
-          <a:xfrm>
-            <a:off x="500605" y="239087"/>
-            <a:ext cx="4390239" cy="1736521"/>
-          </a:xfrm>
-          <a:prstGeom prst="cloud">
-            <a:avLst/>
-          </a:prstGeom>
-        </p:spPr>
-        <p:style>
-          <a:lnRef idx="2">
-            <a:schemeClr val="accent1">
-              <a:shade val="50000"/>
-            </a:schemeClr>
-          </a:lnRef>
-          <a:fillRef idx="1">
-            <a:schemeClr val="accent1"/>
-          </a:fillRef>
-          <a:effectRef idx="0">
-            <a:schemeClr val="accent1"/>
-          </a:effectRef>
-          <a:fontRef idx="minor">
-            <a:schemeClr val="lt1"/>
-          </a:fontRef>
-        </p:style>
-        <p:txBody>
-          <a:bodyPr rtlCol="0" anchor="ctr"/>
-          <a:lstStyle/>
-          <a:p>
-            <a:pPr algn="ctr"/>
-            <a:r>
-              <a:rPr lang="en-US" sz="1600" dirty="0"/>
-              <a:t>Is there a widespread discrimination and non neutrality in the tone of questions posted on </a:t>
-            </a:r>
-            <a:r>
-              <a:rPr lang="en-US" sz="1600" dirty="0" err="1"/>
-              <a:t>quora</a:t>
-            </a:r>
-            <a:r>
-              <a:rPr lang="en-US" sz="1600" dirty="0"/>
-              <a:t>? </a:t>
-            </a:r>
-          </a:p>
-        </p:txBody>
-      </p:sp>
       <p:pic>
         <p:nvPicPr>
           <p:cNvPr id="11" name="Picture 10" descr="A person wearing a suit and tie&#10;&#10;Description automatically generated">
@@ -19873,6 +19816,189 @@
       </p:sp>
       <p:pic>
         <p:nvPicPr>
+          <p:cNvPr id="12" name="Picture 11" descr="A picture containing calendar&#10;&#10;Description automatically generated">
+            <a:extLst>
+              <a:ext uri="{FF2B5EF4-FFF2-40B4-BE49-F238E27FC236}">
+                <a16:creationId xmlns:a16="http://schemas.microsoft.com/office/drawing/2014/main" id="{A3CA2624-192E-4986-8F87-C9E33035FE8E}"/>
+              </a:ext>
+            </a:extLst>
+          </p:cNvPr>
+          <p:cNvPicPr>
+            <a:picLocks noChangeAspect="1"/>
+          </p:cNvPicPr>
+          <p:nvPr/>
+        </p:nvPicPr>
+        <p:blipFill rotWithShape="1">
+          <a:blip r:embed="rId7">
+            <a:extLst>
+              <a:ext uri="{28A0092B-C50C-407E-A947-70E740481C1C}">
+                <a14:useLocalDpi xmlns:a14="http://schemas.microsoft.com/office/drawing/2010/main" val="0"/>
+              </a:ext>
+            </a:extLst>
+          </a:blip>
+          <a:srcRect b="8326"/>
+          <a:stretch/>
+        </p:blipFill>
+        <p:spPr>
+          <a:xfrm>
+            <a:off x="6065843" y="4569522"/>
+            <a:ext cx="1607900" cy="1590041"/>
+          </a:xfrm>
+          <a:prstGeom prst="rect">
+            <a:avLst/>
+          </a:prstGeom>
+        </p:spPr>
+      </p:pic>
+      <p:sp>
+        <p:nvSpPr>
+          <p:cNvPr id="15" name="Cloud 14">
+            <a:extLst>
+              <a:ext uri="{FF2B5EF4-FFF2-40B4-BE49-F238E27FC236}">
+                <a16:creationId xmlns:a16="http://schemas.microsoft.com/office/drawing/2014/main" id="{1D75F318-1022-47FD-920F-D3BC6A292ADA}"/>
+              </a:ext>
+            </a:extLst>
+          </p:cNvPr>
+          <p:cNvSpPr/>
+          <p:nvPr/>
+        </p:nvSpPr>
+        <p:spPr>
+          <a:xfrm>
+            <a:off x="5714032" y="3324225"/>
+            <a:ext cx="2603491" cy="1389388"/>
+          </a:xfrm>
+          <a:prstGeom prst="cloud">
+            <a:avLst/>
+          </a:prstGeom>
+          <a:solidFill>
+            <a:schemeClr val="bg1"/>
+          </a:solidFill>
+        </p:spPr>
+        <p:style>
+          <a:lnRef idx="2">
+            <a:schemeClr val="accent1">
+              <a:shade val="50000"/>
+            </a:schemeClr>
+          </a:lnRef>
+          <a:fillRef idx="1">
+            <a:schemeClr val="accent1"/>
+          </a:fillRef>
+          <a:effectRef idx="0">
+            <a:schemeClr val="accent1"/>
+          </a:effectRef>
+          <a:fontRef idx="minor">
+            <a:schemeClr val="lt1"/>
+          </a:fontRef>
+        </p:style>
+        <p:txBody>
+          <a:bodyPr rtlCol="0" anchor="ctr"/>
+          <a:lstStyle/>
+          <a:p>
+            <a:pPr algn="ctr"/>
+            <a:r>
+              <a:rPr lang="en-US" sz="1400" dirty="0">
+                <a:solidFill>
+                  <a:schemeClr val="tx1"/>
+                </a:solidFill>
+              </a:rPr>
+              <a:t>What is this then? Isn’t this misinformation/ non neutral/ insincere data?</a:t>
+            </a:r>
+          </a:p>
+        </p:txBody>
+      </p:sp>
+      <p:pic>
+        <p:nvPicPr>
+          <p:cNvPr id="17" name="Picture 16" descr="A picture containing calendar&#10;&#10;Description automatically generated">
+            <a:extLst>
+              <a:ext uri="{FF2B5EF4-FFF2-40B4-BE49-F238E27FC236}">
+                <a16:creationId xmlns:a16="http://schemas.microsoft.com/office/drawing/2014/main" id="{27D7DD03-0BBF-49F9-B8BE-48703746A624}"/>
+              </a:ext>
+            </a:extLst>
+          </p:cNvPr>
+          <p:cNvPicPr>
+            <a:picLocks noChangeAspect="1"/>
+          </p:cNvPicPr>
+          <p:nvPr/>
+        </p:nvPicPr>
+        <p:blipFill rotWithShape="1">
+          <a:blip r:embed="rId7">
+            <a:extLst>
+              <a:ext uri="{28A0092B-C50C-407E-A947-70E740481C1C}">
+                <a14:useLocalDpi xmlns:a14="http://schemas.microsoft.com/office/drawing/2010/main" val="0"/>
+              </a:ext>
+            </a:extLst>
+          </a:blip>
+          <a:srcRect b="8326"/>
+          <a:stretch/>
+        </p:blipFill>
+        <p:spPr>
+          <a:xfrm>
+            <a:off x="3709016" y="331164"/>
+            <a:ext cx="1607900" cy="1590041"/>
+          </a:xfrm>
+          <a:prstGeom prst="rect">
+            <a:avLst/>
+          </a:prstGeom>
+        </p:spPr>
+      </p:pic>
+      <p:sp>
+        <p:nvSpPr>
+          <p:cNvPr id="7" name="Cloud 6">
+            <a:extLst>
+              <a:ext uri="{FF2B5EF4-FFF2-40B4-BE49-F238E27FC236}">
+                <a16:creationId xmlns:a16="http://schemas.microsoft.com/office/drawing/2014/main" id="{9E137C9A-E087-4B37-A3F0-A0B288707FA2}"/>
+              </a:ext>
+            </a:extLst>
+          </p:cNvPr>
+          <p:cNvSpPr/>
+          <p:nvPr/>
+        </p:nvSpPr>
+        <p:spPr>
+          <a:xfrm>
+            <a:off x="-437148" y="39337"/>
+            <a:ext cx="4390239" cy="1736521"/>
+          </a:xfrm>
+          <a:prstGeom prst="cloud">
+            <a:avLst/>
+          </a:prstGeom>
+        </p:spPr>
+        <p:style>
+          <a:lnRef idx="2">
+            <a:schemeClr val="accent1">
+              <a:shade val="50000"/>
+            </a:schemeClr>
+          </a:lnRef>
+          <a:fillRef idx="1">
+            <a:schemeClr val="accent1"/>
+          </a:fillRef>
+          <a:effectRef idx="0">
+            <a:schemeClr val="accent1"/>
+          </a:effectRef>
+          <a:fontRef idx="minor">
+            <a:schemeClr val="lt1"/>
+          </a:fontRef>
+        </p:style>
+        <p:txBody>
+          <a:bodyPr rtlCol="0" anchor="ctr"/>
+          <a:lstStyle/>
+          <a:p>
+            <a:pPr algn="ctr"/>
+            <a:r>
+              <a:rPr lang="en-US" sz="1600" dirty="0"/>
+              <a:t>Is there a widespread discrimination and non neutrality in the tone of questions posted on </a:t>
+            </a:r>
+            <a:r>
+              <a:rPr lang="en-US" sz="1600" dirty="0" err="1"/>
+              <a:t>quora</a:t>
+            </a:r>
+            <a:r>
+              <a:rPr lang="en-US" sz="1600" dirty="0"/>
+              <a:t>? </a:t>
+            </a:r>
+          </a:p>
+        </p:txBody>
+      </p:sp>
+      <p:pic>
+        <p:nvPicPr>
           <p:cNvPr id="16" name="Picture 15" descr="A person looking at the camera&#10;&#10;Description automatically generated">
             <a:extLst>
               <a:ext uri="{FF2B5EF4-FFF2-40B4-BE49-F238E27FC236}">
@@ -19886,7 +20012,8 @@
           <p:nvPr/>
         </p:nvPicPr>
         <p:blipFill>
-          <a:blip r:embed="rId7">
+          <a:blip r:embed="rId8">
+            <a:alphaModFix amt="50000"/>
             <a:extLst>
               <a:ext uri="{28A0092B-C50C-407E-A947-70E740481C1C}">
                 <a14:useLocalDpi xmlns:a14="http://schemas.microsoft.com/office/drawing/2010/main" val="0"/>
@@ -19899,7 +20026,7 @@
         </p:blipFill>
         <p:spPr>
           <a:xfrm>
-            <a:off x="5072841" y="423896"/>
+            <a:off x="5072841" y="385796"/>
             <a:ext cx="2516697" cy="1576878"/>
           </a:xfrm>
           <a:prstGeom prst="rect">
@@ -20017,7 +20144,7 @@
       </p:pic>
       <p:pic>
         <p:nvPicPr>
-          <p:cNvPr id="14" name="Picture 13" descr="A group of people posing for the camera&#10;&#10;Description automatically generated">
+          <p:cNvPr id="14" name="Picture 13">
             <a:extLst>
               <a:ext uri="{FF2B5EF4-FFF2-40B4-BE49-F238E27FC236}">
                 <a16:creationId xmlns:a16="http://schemas.microsoft.com/office/drawing/2014/main" id="{D90A55B2-CE5D-4C50-9E94-9D599EB6AE97}"/>
@@ -20031,21 +20158,20 @@
         </p:nvPicPr>
         <p:blipFill>
           <a:blip r:embed="rId4">
-            <a:alphaModFix amt="20000"/>
+            <a:alphaModFix amt="35000"/>
             <a:extLst>
               <a:ext uri="{28A0092B-C50C-407E-A947-70E740481C1C}">
                 <a14:useLocalDpi xmlns:a14="http://schemas.microsoft.com/office/drawing/2010/main" val="0"/>
               </a:ext>
             </a:extLst>
           </a:blip>
-          <a:stretch>
-            <a:fillRect/>
-          </a:stretch>
+          <a:srcRect/>
+          <a:stretch/>
         </p:blipFill>
         <p:spPr>
           <a:xfrm>
-            <a:off x="7038263" y="426166"/>
-            <a:ext cx="1496724" cy="734330"/>
+            <a:off x="7038263" y="47771"/>
+            <a:ext cx="1547222" cy="1243968"/>
           </a:xfrm>
           <a:prstGeom prst="rect">
             <a:avLst/>
@@ -20066,7 +20192,7 @@
           </p:cNvPicPr>
           <p:nvPr/>
         </p:nvPicPr>
-        <p:blipFill>
+        <p:blipFill rotWithShape="1">
           <a:blip r:embed="rId5">
             <a:extLst>
               <a:ext uri="{28A0092B-C50C-407E-A947-70E740481C1C}">
@@ -20074,51 +20200,13 @@
               </a:ext>
             </a:extLst>
           </a:blip>
-          <a:stretch>
-            <a:fillRect/>
-          </a:stretch>
+          <a:srcRect t="23246" b="25895"/>
+          <a:stretch/>
         </p:blipFill>
         <p:spPr>
           <a:xfrm>
-            <a:off x="5684269" y="866970"/>
-            <a:ext cx="1353994" cy="1353994"/>
-          </a:xfrm>
-          <a:prstGeom prst="rect">
-            <a:avLst/>
-          </a:prstGeom>
-        </p:spPr>
-      </p:pic>
-      <p:pic>
-        <p:nvPicPr>
-          <p:cNvPr id="22" name="Picture 21" descr="A person smiling for the camera&#10;&#10;Description automatically generated">
-            <a:extLst>
-              <a:ext uri="{FF2B5EF4-FFF2-40B4-BE49-F238E27FC236}">
-                <a16:creationId xmlns:a16="http://schemas.microsoft.com/office/drawing/2014/main" id="{7C90E273-7112-4A65-A538-A0454C481F46}"/>
-              </a:ext>
-            </a:extLst>
-          </p:cNvPr>
-          <p:cNvPicPr>
-            <a:picLocks noChangeAspect="1"/>
-          </p:cNvPicPr>
-          <p:nvPr/>
-        </p:nvPicPr>
-        <p:blipFill>
-          <a:blip r:embed="rId6">
-            <a:alphaModFix amt="50000"/>
-            <a:extLst>
-              <a:ext uri="{28A0092B-C50C-407E-A947-70E740481C1C}">
-                <a14:useLocalDpi xmlns:a14="http://schemas.microsoft.com/office/drawing/2010/main" val="0"/>
-              </a:ext>
-            </a:extLst>
-          </a:blip>
-          <a:stretch>
-            <a:fillRect/>
-          </a:stretch>
-        </p:blipFill>
-        <p:spPr>
-          <a:xfrm>
-            <a:off x="4097365" y="681365"/>
-            <a:ext cx="1711181" cy="958261"/>
+            <a:off x="5684269" y="1200767"/>
+            <a:ext cx="1353994" cy="688625"/>
           </a:xfrm>
           <a:prstGeom prst="rect">
             <a:avLst/>
@@ -20140,7 +20228,7 @@
           <p:nvPr/>
         </p:nvPicPr>
         <p:blipFill>
-          <a:blip r:embed="rId7">
+          <a:blip r:embed="rId6">
             <a:alphaModFix amt="35000"/>
             <a:extLst>
               <a:ext uri="{28A0092B-C50C-407E-A947-70E740481C1C}">
@@ -20154,8 +20242,8 @@
         </p:blipFill>
         <p:spPr>
           <a:xfrm>
-            <a:off x="6425503" y="1859863"/>
-            <a:ext cx="1395546" cy="925308"/>
+            <a:off x="6165034" y="1928601"/>
+            <a:ext cx="1704352" cy="1130060"/>
           </a:xfrm>
           <a:prstGeom prst="rect">
             <a:avLst/>
@@ -20177,7 +20265,7 @@
           <p:nvPr/>
         </p:nvPicPr>
         <p:blipFill>
-          <a:blip r:embed="rId8">
+          <a:blip r:embed="rId7">
             <a:alphaModFix amt="35000"/>
             <a:extLst>
               <a:ext uri="{28A0092B-C50C-407E-A947-70E740481C1C}">
@@ -20214,7 +20302,7 @@
           <p:nvPr/>
         </p:nvPicPr>
         <p:blipFill rotWithShape="1">
-          <a:blip r:embed="rId9">
+          <a:blip r:embed="rId8">
             <a:extLst>
               <a:ext uri="{28A0092B-C50C-407E-A947-70E740481C1C}">
                 <a14:useLocalDpi xmlns:a14="http://schemas.microsoft.com/office/drawing/2010/main" val="0"/>
@@ -20249,7 +20337,7 @@
           <p:nvPr/>
         </p:nvPicPr>
         <p:blipFill>
-          <a:blip r:embed="rId10">
+          <a:blip r:embed="rId9">
             <a:alphaModFix amt="35000"/>
             <a:extLst>
               <a:ext uri="{28A0092B-C50C-407E-A947-70E740481C1C}">
@@ -20317,20 +20405,12 @@
           <a:p>
             <a:pPr algn="ctr"/>
             <a:r>
-              <a:rPr lang="en-US" sz="1600" dirty="0" err="1">
-                <a:solidFill>
-                  <a:schemeClr val="tx1"/>
-                </a:solidFill>
-              </a:rPr>
-              <a:t>Mr</a:t>
-            </a:r>
-            <a:r>
               <a:rPr lang="en-US" sz="1600" dirty="0">
                 <a:solidFill>
                   <a:schemeClr val="tx1"/>
                 </a:solidFill>
               </a:rPr>
-              <a:t> Trump and team, ever heard about fake news?</a:t>
+              <a:t>Folks, ever heard about fake news?</a:t>
             </a:r>
           </a:p>
           <a:p>
@@ -20342,55 +20422,6 @@
                 </a:solidFill>
               </a:rPr>
               <a:t>We are here to do policing and punish the misinformation spreaders</a:t>
-            </a:r>
-          </a:p>
-        </p:txBody>
-      </p:sp>
-      <p:sp>
-        <p:nvSpPr>
-          <p:cNvPr id="6" name="Cloud 5">
-            <a:extLst>
-              <a:ext uri="{FF2B5EF4-FFF2-40B4-BE49-F238E27FC236}">
-                <a16:creationId xmlns:a16="http://schemas.microsoft.com/office/drawing/2014/main" id="{E4355507-E0D5-45E1-8327-C71396C1F8C0}"/>
-              </a:ext>
-            </a:extLst>
-          </p:cNvPr>
-          <p:cNvSpPr/>
-          <p:nvPr/>
-        </p:nvSpPr>
-        <p:spPr>
-          <a:xfrm>
-            <a:off x="103304" y="123342"/>
-            <a:ext cx="3780686" cy="1736521"/>
-          </a:xfrm>
-          <a:prstGeom prst="cloud">
-            <a:avLst/>
-          </a:prstGeom>
-        </p:spPr>
-        <p:style>
-          <a:lnRef idx="2">
-            <a:schemeClr val="accent1">
-              <a:shade val="50000"/>
-            </a:schemeClr>
-          </a:lnRef>
-          <a:fillRef idx="1">
-            <a:schemeClr val="accent1"/>
-          </a:fillRef>
-          <a:effectRef idx="0">
-            <a:schemeClr val="accent1"/>
-          </a:effectRef>
-          <a:fontRef idx="minor">
-            <a:schemeClr val="lt1"/>
-          </a:fontRef>
-        </p:style>
-        <p:txBody>
-          <a:bodyPr rtlCol="0" anchor="ctr"/>
-          <a:lstStyle/>
-          <a:p>
-            <a:pPr algn="ctr"/>
-            <a:r>
-              <a:rPr lang="en-US" sz="1600" dirty="0"/>
-              <a:t>If you were not convinced by what I showed earlier, see these most frequent bigram words….</a:t>
             </a:r>
           </a:p>
         </p:txBody>
@@ -20456,7 +20487,7 @@
         </p:nvSpPr>
         <p:spPr>
           <a:xfrm>
-            <a:off x="9086678" y="176843"/>
+            <a:off x="8635461" y="60403"/>
             <a:ext cx="3176238" cy="1023924"/>
           </a:xfrm>
           <a:prstGeom prst="cloud">
@@ -20486,11 +20517,169 @@
             <a:pPr algn="ctr"/>
             <a:r>
               <a:rPr lang="en-US" sz="1600" dirty="0"/>
-              <a:t>I just want the limelight…</a:t>
+              <a:t>“No news is bad news”…We just want the limelight…</a:t>
             </a:r>
           </a:p>
         </p:txBody>
       </p:sp>
+      <p:pic>
+        <p:nvPicPr>
+          <p:cNvPr id="15" name="Picture 14" descr="A picture containing calendar&#10;&#10;Description automatically generated">
+            <a:extLst>
+              <a:ext uri="{FF2B5EF4-FFF2-40B4-BE49-F238E27FC236}">
+                <a16:creationId xmlns:a16="http://schemas.microsoft.com/office/drawing/2014/main" id="{C93FFC89-051A-4604-BBEB-2CD203D25F84}"/>
+              </a:ext>
+            </a:extLst>
+          </p:cNvPr>
+          <p:cNvPicPr>
+            <a:picLocks noChangeAspect="1"/>
+          </p:cNvPicPr>
+          <p:nvPr/>
+        </p:nvPicPr>
+        <p:blipFill rotWithShape="1">
+          <a:blip r:embed="rId8">
+            <a:extLst>
+              <a:ext uri="{28A0092B-C50C-407E-A947-70E740481C1C}">
+                <a14:useLocalDpi xmlns:a14="http://schemas.microsoft.com/office/drawing/2010/main" val="0"/>
+              </a:ext>
+            </a:extLst>
+          </a:blip>
+          <a:srcRect b="8326"/>
+          <a:stretch/>
+        </p:blipFill>
+        <p:spPr>
+          <a:xfrm>
+            <a:off x="2005972" y="1543967"/>
+            <a:ext cx="1607900" cy="1590041"/>
+          </a:xfrm>
+          <a:prstGeom prst="rect">
+            <a:avLst/>
+          </a:prstGeom>
+        </p:spPr>
+      </p:pic>
+      <p:sp>
+        <p:nvSpPr>
+          <p:cNvPr id="6" name="Cloud 5">
+            <a:extLst>
+              <a:ext uri="{FF2B5EF4-FFF2-40B4-BE49-F238E27FC236}">
+                <a16:creationId xmlns:a16="http://schemas.microsoft.com/office/drawing/2014/main" id="{E4355507-E0D5-45E1-8327-C71396C1F8C0}"/>
+              </a:ext>
+            </a:extLst>
+          </p:cNvPr>
+          <p:cNvSpPr/>
+          <p:nvPr/>
+        </p:nvSpPr>
+        <p:spPr>
+          <a:xfrm>
+            <a:off x="103304" y="104292"/>
+            <a:ext cx="3780686" cy="1736521"/>
+          </a:xfrm>
+          <a:prstGeom prst="cloud">
+            <a:avLst/>
+          </a:prstGeom>
+        </p:spPr>
+        <p:style>
+          <a:lnRef idx="2">
+            <a:schemeClr val="accent1">
+              <a:shade val="50000"/>
+            </a:schemeClr>
+          </a:lnRef>
+          <a:fillRef idx="1">
+            <a:schemeClr val="accent1"/>
+          </a:fillRef>
+          <a:effectRef idx="0">
+            <a:schemeClr val="accent1"/>
+          </a:effectRef>
+          <a:fontRef idx="minor">
+            <a:schemeClr val="lt1"/>
+          </a:fontRef>
+        </p:style>
+        <p:txBody>
+          <a:bodyPr rtlCol="0" anchor="ctr"/>
+          <a:lstStyle/>
+          <a:p>
+            <a:pPr algn="ctr"/>
+            <a:r>
+              <a:rPr lang="en-US" sz="1600" dirty="0"/>
+              <a:t>If you were not convinced by what I showed earlier, see these most frequent bigram words….</a:t>
+            </a:r>
+          </a:p>
+        </p:txBody>
+      </p:sp>
+      <p:pic>
+        <p:nvPicPr>
+          <p:cNvPr id="3" name="Picture 2" descr="Two men in a room&#10;&#10;Description automatically generated">
+            <a:extLst>
+              <a:ext uri="{FF2B5EF4-FFF2-40B4-BE49-F238E27FC236}">
+                <a16:creationId xmlns:a16="http://schemas.microsoft.com/office/drawing/2014/main" id="{80A49258-01AE-4005-86A8-D210F63D4EB5}"/>
+              </a:ext>
+            </a:extLst>
+          </p:cNvPr>
+          <p:cNvPicPr>
+            <a:picLocks noChangeAspect="1"/>
+          </p:cNvPicPr>
+          <p:nvPr/>
+        </p:nvPicPr>
+        <p:blipFill>
+          <a:blip r:embed="rId10">
+            <a:alphaModFix amt="35000"/>
+            <a:extLst>
+              <a:ext uri="{28A0092B-C50C-407E-A947-70E740481C1C}">
+                <a14:useLocalDpi xmlns:a14="http://schemas.microsoft.com/office/drawing/2010/main" val="0"/>
+              </a:ext>
+            </a:extLst>
+          </a:blip>
+          <a:stretch>
+            <a:fillRect/>
+          </a:stretch>
+        </p:blipFill>
+        <p:spPr>
+          <a:xfrm>
+            <a:off x="5076825" y="66581"/>
+            <a:ext cx="1694232" cy="847116"/>
+          </a:xfrm>
+          <a:prstGeom prst="rect">
+            <a:avLst/>
+          </a:prstGeom>
+        </p:spPr>
+      </p:pic>
+      <p:pic>
+        <p:nvPicPr>
+          <p:cNvPr id="22" name="Picture 21" descr="A person smiling for the camera&#10;&#10;Description automatically generated">
+            <a:extLst>
+              <a:ext uri="{FF2B5EF4-FFF2-40B4-BE49-F238E27FC236}">
+                <a16:creationId xmlns:a16="http://schemas.microsoft.com/office/drawing/2014/main" id="{7C90E273-7112-4A65-A538-A0454C481F46}"/>
+              </a:ext>
+            </a:extLst>
+          </p:cNvPr>
+          <p:cNvPicPr>
+            <a:picLocks noChangeAspect="1"/>
+          </p:cNvPicPr>
+          <p:nvPr/>
+        </p:nvPicPr>
+        <p:blipFill>
+          <a:blip r:embed="rId11">
+            <a:alphaModFix amt="35000"/>
+            <a:extLst>
+              <a:ext uri="{28A0092B-C50C-407E-A947-70E740481C1C}">
+                <a14:useLocalDpi xmlns:a14="http://schemas.microsoft.com/office/drawing/2010/main" val="0"/>
+              </a:ext>
+            </a:extLst>
+          </a:blip>
+          <a:stretch>
+            <a:fillRect/>
+          </a:stretch>
+        </p:blipFill>
+        <p:spPr>
+          <a:xfrm>
+            <a:off x="4097365" y="700415"/>
+            <a:ext cx="1711181" cy="958261"/>
+          </a:xfrm>
+          <a:prstGeom prst="rect">
+            <a:avLst/>
+          </a:prstGeom>
+        </p:spPr>
+      </p:pic>
     </p:spTree>
     <p:extLst>
       <p:ext uri="{BB962C8B-B14F-4D97-AF65-F5344CB8AC3E}">

</xml_diff>